<commit_message>
presentation diagrams for CO emission in the US
</commit_message>
<xml_diff>
--- a/project/presentation/presentationv.1.pptx
+++ b/project/presentation/presentationv.1.pptx
@@ -5,13 +5,15 @@
     <p:sldMasterId id="2147483780" r:id="rId1"/>
   </p:sldMasterIdLst>
   <p:notesMasterIdLst>
-    <p:notesMasterId r:id="rId6"/>
+    <p:notesMasterId r:id="rId8"/>
   </p:notesMasterIdLst>
   <p:sldIdLst>
     <p:sldId id="256" r:id="rId2"/>
     <p:sldId id="257" r:id="rId3"/>
     <p:sldId id="258" r:id="rId4"/>
-    <p:sldId id="259" r:id="rId5"/>
+    <p:sldId id="261" r:id="rId5"/>
+    <p:sldId id="259" r:id="rId6"/>
+    <p:sldId id="260" r:id="rId7"/>
   </p:sldIdLst>
   <p:sldSz cx="12192000" cy="6858000"/>
   <p:notesSz cx="6858000" cy="9144000"/>
@@ -110,6 +112,11 @@
       </a:defRPr>
     </a:lvl9pPr>
   </p:defaultTextStyle>
+  <p:extLst>
+    <p:ext uri="{EFAFB233-063F-42B5-8137-9DF3F51BA10A}">
+      <p15:sldGuideLst xmlns:p15="http://schemas.microsoft.com/office/powerpoint/2012/main"/>
+    </p:ext>
+  </p:extLst>
 </p:presentation>
 </file>
 
@@ -195,7 +202,7 @@
           <a:p>
             <a:fld id="{FF12B8C3-9D6D-3B4F-8AD4-4F47F2D67EFA}" type="datetimeFigureOut">
               <a:rPr lang="en-US" smtClean="0"/>
-              <a:t>3/2/19</a:t>
+              <a:t>3/3/19</a:t>
             </a:fld>
             <a:endParaRPr lang="en-US"/>
           </a:p>
@@ -678,7 +685,7 @@
           <a:p>
             <a:fld id="{1872AB03-3854-304B-BB5D-51F881BC6E6E}" type="datetimeFigureOut">
               <a:rPr lang="en-US" smtClean="0"/>
-              <a:t>3/2/19</a:t>
+              <a:t>3/3/19</a:t>
             </a:fld>
             <a:endParaRPr lang="en-US"/>
           </a:p>
@@ -843,7 +850,7 @@
           <a:p>
             <a:fld id="{1872AB03-3854-304B-BB5D-51F881BC6E6E}" type="datetimeFigureOut">
               <a:rPr lang="en-US" smtClean="0"/>
-              <a:t>3/2/19</a:t>
+              <a:t>3/3/19</a:t>
             </a:fld>
             <a:endParaRPr lang="en-US"/>
           </a:p>
@@ -1018,7 +1025,7 @@
           <a:p>
             <a:fld id="{1872AB03-3854-304B-BB5D-51F881BC6E6E}" type="datetimeFigureOut">
               <a:rPr lang="en-US" smtClean="0"/>
-              <a:t>3/2/19</a:t>
+              <a:t>3/3/19</a:t>
             </a:fld>
             <a:endParaRPr lang="en-US"/>
           </a:p>
@@ -1183,7 +1190,7 @@
           <a:p>
             <a:fld id="{1872AB03-3854-304B-BB5D-51F881BC6E6E}" type="datetimeFigureOut">
               <a:rPr lang="en-US" smtClean="0"/>
-              <a:t>3/2/19</a:t>
+              <a:t>3/3/19</a:t>
             </a:fld>
             <a:endParaRPr lang="en-US"/>
           </a:p>
@@ -1424,7 +1431,7 @@
           <a:p>
             <a:fld id="{1872AB03-3854-304B-BB5D-51F881BC6E6E}" type="datetimeFigureOut">
               <a:rPr lang="en-US" smtClean="0"/>
-              <a:t>3/2/19</a:t>
+              <a:t>3/3/19</a:t>
             </a:fld>
             <a:endParaRPr lang="en-US"/>
           </a:p>
@@ -1651,7 +1658,7 @@
           <a:p>
             <a:fld id="{1872AB03-3854-304B-BB5D-51F881BC6E6E}" type="datetimeFigureOut">
               <a:rPr lang="en-US" smtClean="0"/>
-              <a:t>3/2/19</a:t>
+              <a:t>3/3/19</a:t>
             </a:fld>
             <a:endParaRPr lang="en-US"/>
           </a:p>
@@ -2013,7 +2020,7 @@
           <a:p>
             <a:fld id="{1872AB03-3854-304B-BB5D-51F881BC6E6E}" type="datetimeFigureOut">
               <a:rPr lang="en-US" smtClean="0"/>
-              <a:t>3/2/19</a:t>
+              <a:t>3/3/19</a:t>
             </a:fld>
             <a:endParaRPr lang="en-US"/>
           </a:p>
@@ -2126,7 +2133,7 @@
           <a:p>
             <a:fld id="{1872AB03-3854-304B-BB5D-51F881BC6E6E}" type="datetimeFigureOut">
               <a:rPr lang="en-US" smtClean="0"/>
-              <a:t>3/2/19</a:t>
+              <a:t>3/3/19</a:t>
             </a:fld>
             <a:endParaRPr lang="en-US"/>
           </a:p>
@@ -2216,7 +2223,7 @@
           <a:p>
             <a:fld id="{1872AB03-3854-304B-BB5D-51F881BC6E6E}" type="datetimeFigureOut">
               <a:rPr lang="en-US" smtClean="0"/>
-              <a:t>3/2/19</a:t>
+              <a:t>3/3/19</a:t>
             </a:fld>
             <a:endParaRPr lang="en-US"/>
           </a:p>
@@ -2488,7 +2495,7 @@
           <a:p>
             <a:fld id="{1872AB03-3854-304B-BB5D-51F881BC6E6E}" type="datetimeFigureOut">
               <a:rPr lang="en-US" smtClean="0"/>
-              <a:t>3/2/19</a:t>
+              <a:t>3/3/19</a:t>
             </a:fld>
             <a:endParaRPr lang="en-US"/>
           </a:p>
@@ -2740,7 +2747,7 @@
           <a:p>
             <a:fld id="{1872AB03-3854-304B-BB5D-51F881BC6E6E}" type="datetimeFigureOut">
               <a:rPr lang="en-US" smtClean="0"/>
-              <a:t>3/2/19</a:t>
+              <a:t>3/3/19</a:t>
             </a:fld>
             <a:endParaRPr lang="en-US"/>
           </a:p>
@@ -2948,7 +2955,7 @@
           <a:p>
             <a:fld id="{1872AB03-3854-304B-BB5D-51F881BC6E6E}" type="datetimeFigureOut">
               <a:rPr lang="en-US" smtClean="0"/>
-              <a:t>3/2/19</a:t>
+              <a:t>3/3/19</a:t>
             </a:fld>
             <a:endParaRPr lang="en-US"/>
           </a:p>
@@ -3414,26 +3421,10 @@
               <a:t>levels in the </a:t>
             </a:r>
             <a:r>
-              <a:rPr lang="en-US" b="1" dirty="0" smtClean="0"/>
-              <a:t>U</a:t>
-            </a:r>
-            <a:r>
               <a:rPr lang="en-US" dirty="0" smtClean="0"/>
-              <a:t>.</a:t>
-            </a:r>
-            <a:r>
-              <a:rPr lang="en-US" b="1" dirty="0" smtClean="0">
-                <a:solidFill>
-                  <a:srgbClr val="C00000"/>
-                </a:solidFill>
-              </a:rPr>
-              <a:t>S</a:t>
-            </a:r>
-            <a:endParaRPr lang="en-US" b="1" dirty="0">
-              <a:solidFill>
-                <a:srgbClr val="C00000"/>
-              </a:solidFill>
-            </a:endParaRPr>
+              <a:t>U.S</a:t>
+            </a:r>
+            <a:endParaRPr lang="en-US" dirty="0"/>
           </a:p>
         </p:txBody>
       </p:sp>
@@ -3621,11 +3612,7 @@
             </a:r>
             <a:r>
               <a:rPr lang="en-US" sz="2400" i="1" dirty="0"/>
-              <a:t>CO </a:t>
-            </a:r>
-            <a:r>
-              <a:rPr lang="en-US" sz="2400" i="1" dirty="0"/>
-              <a:t>is a </a:t>
+              <a:t>CO is a </a:t>
             </a:r>
             <a:r>
               <a:rPr lang="en-US" sz="2400" b="1" i="1" dirty="0">
@@ -3697,7 +3684,7 @@
             </a:r>
             <a:r>
               <a:rPr lang="en-US" sz="2400" i="1" dirty="0" smtClean="0"/>
-              <a:t>U.S * with </a:t>
+              <a:t>U.S with </a:t>
             </a:r>
             <a:r>
               <a:rPr lang="en-US" sz="2400" b="1" i="1" dirty="0" smtClean="0">
@@ -3745,7 +3732,7 @@
       </p:sp>
       <p:pic>
         <p:nvPicPr>
-          <p:cNvPr id="7" name="Content Placeholder 6"/>
+          <p:cNvPr id="4" name="Content Placeholder 3"/>
           <p:cNvPicPr>
             <a:picLocks noGrp="1" noChangeAspect="1"/>
           </p:cNvPicPr>
@@ -3767,8 +3754,8 @@
         </p:blipFill>
         <p:spPr>
           <a:xfrm>
-            <a:off x="838200" y="2035968"/>
-            <a:ext cx="9890933" cy="3679031"/>
+            <a:off x="994610" y="1997245"/>
+            <a:ext cx="9901001" cy="3739941"/>
           </a:xfrm>
         </p:spPr>
       </p:pic>
@@ -3811,13 +3798,15 @@
       </p:grpSpPr>
       <p:pic>
         <p:nvPicPr>
-          <p:cNvPr id="5" name="Picture 4"/>
+          <p:cNvPr id="10" name="Content Placeholder 3"/>
           <p:cNvPicPr>
-            <a:picLocks noChangeAspect="1"/>
+            <a:picLocks noGrp="1" noChangeAspect="1"/>
           </p:cNvPicPr>
-          <p:nvPr/>
+          <p:nvPr>
+            <p:ph idx="1"/>
+          </p:nvPr>
         </p:nvPicPr>
-        <p:blipFill>
+        <p:blipFill rotWithShape="1">
           <a:blip r:embed="rId2">
             <a:extLst>
               <a:ext uri="{28A0092B-C50C-407E-A947-70E740481C1C}">
@@ -3825,18 +3814,14 @@
               </a:ext>
             </a:extLst>
           </a:blip>
-          <a:stretch>
-            <a:fillRect/>
-          </a:stretch>
+          <a:srcRect r="-3381" b="20591"/>
+          <a:stretch/>
         </p:blipFill>
         <p:spPr>
           <a:xfrm>
-            <a:off x="1435100" y="469900"/>
-            <a:ext cx="9309100" cy="5918200"/>
+            <a:off x="1697555" y="365125"/>
+            <a:ext cx="8649603" cy="4640012"/>
           </a:xfrm>
-          <a:prstGeom prst="rect">
-            <a:avLst/>
-          </a:prstGeom>
         </p:spPr>
       </p:pic>
       <p:sp>
@@ -3879,25 +3864,6 @@
                 <a:srgbClr val="C00000"/>
               </a:solidFill>
             </a:endParaRPr>
-          </a:p>
-        </p:txBody>
-      </p:sp>
-      <p:sp>
-        <p:nvSpPr>
-          <p:cNvPr id="6" name="Content Placeholder 5"/>
-          <p:cNvSpPr>
-            <a:spLocks noGrp="1"/>
-          </p:cNvSpPr>
-          <p:nvPr>
-            <p:ph idx="1"/>
-          </p:nvPr>
-        </p:nvSpPr>
-        <p:spPr/>
-        <p:txBody>
-          <a:bodyPr/>
-          <a:lstStyle/>
-          <a:p>
-            <a:endParaRPr lang="en-US" dirty="0"/>
           </a:p>
         </p:txBody>
       </p:sp>
@@ -3938,6 +3904,35 @@
           <a:chExt cx="0" cy="0"/>
         </a:xfrm>
       </p:grpSpPr>
+      <p:pic>
+        <p:nvPicPr>
+          <p:cNvPr id="4" name="Content Placeholder 3"/>
+          <p:cNvPicPr>
+            <a:picLocks noGrp="1" noChangeAspect="1"/>
+          </p:cNvPicPr>
+          <p:nvPr>
+            <p:ph idx="1"/>
+          </p:nvPr>
+        </p:nvPicPr>
+        <p:blipFill>
+          <a:blip r:embed="rId2">
+            <a:extLst>
+              <a:ext uri="{28A0092B-C50C-407E-A947-70E740481C1C}">
+                <a14:useLocalDpi xmlns:a14="http://schemas.microsoft.com/office/drawing/2010/main" val="0"/>
+              </a:ext>
+            </a:extLst>
+          </a:blip>
+          <a:stretch>
+            <a:fillRect/>
+          </a:stretch>
+        </p:blipFill>
+        <p:spPr>
+          <a:xfrm>
+            <a:off x="1697555" y="365125"/>
+            <a:ext cx="8366743" cy="5843170"/>
+          </a:xfrm>
+        </p:spPr>
+      </p:pic>
       <p:sp>
         <p:nvSpPr>
           <p:cNvPr id="2" name="Title 1"/>
@@ -3955,7 +3950,7 @@
           <a:p>
             <a:r>
               <a:rPr lang="en-US" b="1" dirty="0" smtClean="0"/>
-              <a:t>What </a:t>
+              <a:t>How </a:t>
             </a:r>
             <a:r>
               <a:rPr lang="en-US" b="1" dirty="0" smtClean="0">
@@ -3965,6 +3960,86 @@
               </a:rPr>
               <a:t>?</a:t>
             </a:r>
+            <a:r>
+              <a:rPr lang="en-US" dirty="0" smtClean="0">
+                <a:solidFill>
+                  <a:srgbClr val="C00000"/>
+                </a:solidFill>
+              </a:rPr>
+              <a:t> </a:t>
+            </a:r>
+            <a:endParaRPr lang="en-US" dirty="0">
+              <a:solidFill>
+                <a:srgbClr val="C00000"/>
+              </a:solidFill>
+            </a:endParaRPr>
+          </a:p>
+        </p:txBody>
+      </p:sp>
+    </p:spTree>
+    <p:extLst>
+      <p:ext uri="{BB962C8B-B14F-4D97-AF65-F5344CB8AC3E}">
+        <p14:creationId xmlns:p14="http://schemas.microsoft.com/office/powerpoint/2010/main" val="12032593"/>
+      </p:ext>
+    </p:extLst>
+  </p:cSld>
+  <p:clrMapOvr>
+    <a:masterClrMapping/>
+  </p:clrMapOvr>
+  <p:timing>
+    <p:tnLst>
+      <p:par>
+        <p:cTn id="1" dur="indefinite" restart="never" nodeType="tmRoot"/>
+      </p:par>
+    </p:tnLst>
+  </p:timing>
+</p:sld>
+</file>
+
+<file path=ppt/slides/slide5.xml><?xml version="1.0" encoding="utf-8"?>
+<p:sld xmlns:a="http://schemas.openxmlformats.org/drawingml/2006/main" xmlns:r="http://schemas.openxmlformats.org/officeDocument/2006/relationships" xmlns:p="http://schemas.openxmlformats.org/presentationml/2006/main">
+  <p:cSld>
+    <p:spTree>
+      <p:nvGrpSpPr>
+        <p:cNvPr id="1" name=""/>
+        <p:cNvGrpSpPr/>
+        <p:nvPr/>
+      </p:nvGrpSpPr>
+      <p:grpSpPr>
+        <a:xfrm>
+          <a:off x="0" y="0"/>
+          <a:ext cx="0" cy="0"/>
+          <a:chOff x="0" y="0"/>
+          <a:chExt cx="0" cy="0"/>
+        </a:xfrm>
+      </p:grpSpPr>
+      <p:sp>
+        <p:nvSpPr>
+          <p:cNvPr id="2" name="Title 1"/>
+          <p:cNvSpPr>
+            <a:spLocks noGrp="1"/>
+          </p:cNvSpPr>
+          <p:nvPr>
+            <p:ph type="title"/>
+          </p:nvPr>
+        </p:nvSpPr>
+        <p:spPr/>
+        <p:txBody>
+          <a:bodyPr/>
+          <a:lstStyle/>
+          <a:p>
+            <a:r>
+              <a:rPr lang="en-US" b="1" dirty="0" smtClean="0"/>
+              <a:t>What </a:t>
+            </a:r>
+            <a:r>
+              <a:rPr lang="en-US" b="1" dirty="0" smtClean="0">
+                <a:solidFill>
+                  <a:srgbClr val="C00000"/>
+                </a:solidFill>
+              </a:rPr>
+              <a:t>?</a:t>
+            </a:r>
             <a:endParaRPr lang="en-US" b="1" dirty="0">
               <a:solidFill>
                 <a:srgbClr val="C00000"/>
@@ -4136,7 +4211,7 @@
             </a:r>
             <a:r>
               <a:rPr lang="en-US" b="1" dirty="0" smtClean="0"/>
-              <a:t>prediction</a:t>
+              <a:t>predictions</a:t>
             </a:r>
             <a:r>
               <a:rPr lang="en-US" dirty="0" smtClean="0"/>
@@ -4153,6 +4228,164 @@
     <p:extLst>
       <p:ext uri="{BB962C8B-B14F-4D97-AF65-F5344CB8AC3E}">
         <p14:creationId xmlns:p14="http://schemas.microsoft.com/office/powerpoint/2010/main" val="180428536"/>
+      </p:ext>
+    </p:extLst>
+  </p:cSld>
+  <p:clrMapOvr>
+    <a:masterClrMapping/>
+  </p:clrMapOvr>
+  <p:timing>
+    <p:tnLst>
+      <p:par>
+        <p:cTn id="1" dur="indefinite" restart="never" nodeType="tmRoot"/>
+      </p:par>
+    </p:tnLst>
+  </p:timing>
+</p:sld>
+</file>
+
+<file path=ppt/slides/slide6.xml><?xml version="1.0" encoding="utf-8"?>
+<p:sld xmlns:a="http://schemas.openxmlformats.org/drawingml/2006/main" xmlns:r="http://schemas.openxmlformats.org/officeDocument/2006/relationships" xmlns:p="http://schemas.openxmlformats.org/presentationml/2006/main">
+  <p:cSld>
+    <p:spTree>
+      <p:nvGrpSpPr>
+        <p:cNvPr id="1" name=""/>
+        <p:cNvGrpSpPr/>
+        <p:nvPr/>
+      </p:nvGrpSpPr>
+      <p:grpSpPr>
+        <a:xfrm>
+          <a:off x="0" y="0"/>
+          <a:ext cx="0" cy="0"/>
+          <a:chOff x="0" y="0"/>
+          <a:chExt cx="0" cy="0"/>
+        </a:xfrm>
+      </p:grpSpPr>
+      <p:sp>
+        <p:nvSpPr>
+          <p:cNvPr id="2" name="Title 1"/>
+          <p:cNvSpPr>
+            <a:spLocks noGrp="1"/>
+          </p:cNvSpPr>
+          <p:nvPr>
+            <p:ph type="title"/>
+          </p:nvPr>
+        </p:nvSpPr>
+        <p:spPr>
+          <a:xfrm>
+            <a:off x="922421" y="2879725"/>
+            <a:ext cx="10515600" cy="1325563"/>
+          </a:xfrm>
+        </p:spPr>
+        <p:txBody>
+          <a:bodyPr>
+            <a:normAutofit fontScale="90000"/>
+          </a:bodyPr>
+          <a:lstStyle/>
+          <a:p>
+            <a:pPr algn="ctr"/>
+            <a:r>
+              <a:rPr lang="en-US" b="1" dirty="0" smtClean="0"/>
+              <a:t>Thank</a:t>
+            </a:r>
+            <a:r>
+              <a:rPr lang="en-US" dirty="0" smtClean="0"/>
+              <a:t> </a:t>
+            </a:r>
+            <a:r>
+              <a:rPr lang="en-US" b="1" dirty="0" smtClean="0"/>
+              <a:t>you</a:t>
+            </a:r>
+            <a:r>
+              <a:rPr lang="en-US" dirty="0" smtClean="0"/>
+              <a:t> for </a:t>
+            </a:r>
+            <a:br>
+              <a:rPr lang="en-US" dirty="0" smtClean="0"/>
+            </a:br>
+            <a:r>
+              <a:rPr lang="en-US" dirty="0" smtClean="0"/>
+              <a:t>your </a:t>
+            </a:r>
+            <a:br>
+              <a:rPr lang="en-US" dirty="0" smtClean="0"/>
+            </a:br>
+            <a:r>
+              <a:rPr lang="en-US" b="1" dirty="0" smtClean="0">
+                <a:solidFill>
+                  <a:srgbClr val="C00000"/>
+                </a:solidFill>
+              </a:rPr>
+              <a:t>attention</a:t>
+            </a:r>
+            <a:endParaRPr lang="en-US" dirty="0"/>
+          </a:p>
+        </p:txBody>
+      </p:sp>
+      <p:pic>
+        <p:nvPicPr>
+          <p:cNvPr id="3" name="Picture 2"/>
+          <p:cNvPicPr>
+            <a:picLocks noChangeAspect="1"/>
+          </p:cNvPicPr>
+          <p:nvPr/>
+        </p:nvPicPr>
+        <p:blipFill>
+          <a:blip r:embed="rId2">
+            <a:extLst>
+              <a:ext uri="{28A0092B-C50C-407E-A947-70E740481C1C}">
+                <a14:useLocalDpi xmlns:a14="http://schemas.microsoft.com/office/drawing/2010/main" val="0"/>
+              </a:ext>
+            </a:extLst>
+          </a:blip>
+          <a:stretch>
+            <a:fillRect/>
+          </a:stretch>
+        </p:blipFill>
+        <p:spPr>
+          <a:xfrm rot="20028107">
+            <a:off x="1042533" y="1485757"/>
+            <a:ext cx="1988278" cy="1006791"/>
+          </a:xfrm>
+          <a:prstGeom prst="rect">
+            <a:avLst/>
+          </a:prstGeom>
+        </p:spPr>
+      </p:pic>
+      <p:pic>
+        <p:nvPicPr>
+          <p:cNvPr id="4" name="Picture 3"/>
+          <p:cNvPicPr>
+            <a:picLocks noChangeAspect="1"/>
+          </p:cNvPicPr>
+          <p:nvPr/>
+        </p:nvPicPr>
+        <p:blipFill>
+          <a:blip r:embed="rId2">
+            <a:extLst>
+              <a:ext uri="{28A0092B-C50C-407E-A947-70E740481C1C}">
+                <a14:useLocalDpi xmlns:a14="http://schemas.microsoft.com/office/drawing/2010/main" val="0"/>
+              </a:ext>
+            </a:extLst>
+          </a:blip>
+          <a:stretch>
+            <a:fillRect/>
+          </a:stretch>
+        </p:blipFill>
+        <p:spPr>
+          <a:xfrm rot="20028107">
+            <a:off x="9329631" y="4592465"/>
+            <a:ext cx="1988278" cy="1006791"/>
+          </a:xfrm>
+          <a:prstGeom prst="rect">
+            <a:avLst/>
+          </a:prstGeom>
+        </p:spPr>
+      </p:pic>
+    </p:spTree>
+    <p:extLst>
+      <p:ext uri="{BB962C8B-B14F-4D97-AF65-F5344CB8AC3E}">
+        <p14:creationId xmlns:p14="http://schemas.microsoft.com/office/powerpoint/2010/main" val="873180541"/>
       </p:ext>
     </p:extLst>
   </p:cSld>

</xml_diff>